<commit_message>
CV Fred FROMAGER V2.pptx
</commit_message>
<xml_diff>
--- a/CV Fred FROMAGER V2.pptx
+++ b/CV Fred FROMAGER V2.pptx
@@ -198,7 +198,7 @@
           <a:p>
             <a:fld id="{0B931C3E-6BFC-4638-BB9C-51D3F831E5AB}" type="datetimeFigureOut">
               <a:rPr lang="fr-FR" smtClean="0"/>
-              <a:t>25/10/2022</a:t>
+              <a:t>28/10/2022</a:t>
             </a:fld>
             <a:endParaRPr lang="fr-FR"/>
           </a:p>
@@ -262,38 +262,37 @@
           <a:p>
             <a:pPr lvl="0"/>
             <a:r>
-              <a:rPr lang="fr-FR" smtClean="0"/>
+              <a:rPr lang="fr-FR"/>
               <a:t>Modifier les styles du texte du masque</a:t>
             </a:r>
           </a:p>
           <a:p>
             <a:pPr lvl="1"/>
             <a:r>
-              <a:rPr lang="fr-FR" smtClean="0"/>
+              <a:rPr lang="fr-FR"/>
               <a:t>Deuxième niveau</a:t>
             </a:r>
           </a:p>
           <a:p>
             <a:pPr lvl="2"/>
             <a:r>
-              <a:rPr lang="fr-FR" smtClean="0"/>
+              <a:rPr lang="fr-FR"/>
               <a:t>Troisième niveau</a:t>
             </a:r>
           </a:p>
           <a:p>
             <a:pPr lvl="3"/>
             <a:r>
-              <a:rPr lang="fr-FR" smtClean="0"/>
+              <a:rPr lang="fr-FR"/>
               <a:t>Quatrième niveau</a:t>
             </a:r>
           </a:p>
           <a:p>
             <a:pPr lvl="4"/>
             <a:r>
-              <a:rPr lang="fr-FR" smtClean="0"/>
+              <a:rPr lang="fr-FR"/>
               <a:t>Cinquième niveau</a:t>
             </a:r>
-            <a:endParaRPr lang="fr-FR"/>
           </a:p>
         </p:txBody>
       </p:sp>
@@ -597,7 +596,7 @@
           <a:p>
             <a:fld id="{599F6D61-D8C0-4321-8F41-5FC8A4129D8A}" type="datetimeFigureOut">
               <a:rPr lang="fr-FR" smtClean="0"/>
-              <a:t>25/10/2022</a:t>
+              <a:t>28/10/2022</a:t>
             </a:fld>
             <a:endParaRPr lang="fr-FR"/>
           </a:p>
@@ -767,7 +766,7 @@
           <a:p>
             <a:fld id="{599F6D61-D8C0-4321-8F41-5FC8A4129D8A}" type="datetimeFigureOut">
               <a:rPr lang="fr-FR" smtClean="0"/>
-              <a:t>25/10/2022</a:t>
+              <a:t>28/10/2022</a:t>
             </a:fld>
             <a:endParaRPr lang="fr-FR"/>
           </a:p>
@@ -947,7 +946,7 @@
           <a:p>
             <a:fld id="{599F6D61-D8C0-4321-8F41-5FC8A4129D8A}" type="datetimeFigureOut">
               <a:rPr lang="fr-FR" smtClean="0"/>
-              <a:t>25/10/2022</a:t>
+              <a:t>28/10/2022</a:t>
             </a:fld>
             <a:endParaRPr lang="fr-FR"/>
           </a:p>
@@ -1117,7 +1116,7 @@
           <a:p>
             <a:fld id="{599F6D61-D8C0-4321-8F41-5FC8A4129D8A}" type="datetimeFigureOut">
               <a:rPr lang="fr-FR" smtClean="0"/>
-              <a:t>25/10/2022</a:t>
+              <a:t>28/10/2022</a:t>
             </a:fld>
             <a:endParaRPr lang="fr-FR"/>
           </a:p>
@@ -1361,7 +1360,7 @@
           <a:p>
             <a:fld id="{599F6D61-D8C0-4321-8F41-5FC8A4129D8A}" type="datetimeFigureOut">
               <a:rPr lang="fr-FR" smtClean="0"/>
-              <a:t>25/10/2022</a:t>
+              <a:t>28/10/2022</a:t>
             </a:fld>
             <a:endParaRPr lang="fr-FR"/>
           </a:p>
@@ -1593,7 +1592,7 @@
           <a:p>
             <a:fld id="{599F6D61-D8C0-4321-8F41-5FC8A4129D8A}" type="datetimeFigureOut">
               <a:rPr lang="fr-FR" smtClean="0"/>
-              <a:t>25/10/2022</a:t>
+              <a:t>28/10/2022</a:t>
             </a:fld>
             <a:endParaRPr lang="fr-FR"/>
           </a:p>
@@ -1960,7 +1959,7 @@
           <a:p>
             <a:fld id="{599F6D61-D8C0-4321-8F41-5FC8A4129D8A}" type="datetimeFigureOut">
               <a:rPr lang="fr-FR" smtClean="0"/>
-              <a:t>25/10/2022</a:t>
+              <a:t>28/10/2022</a:t>
             </a:fld>
             <a:endParaRPr lang="fr-FR"/>
           </a:p>
@@ -2078,7 +2077,7 @@
           <a:p>
             <a:fld id="{599F6D61-D8C0-4321-8F41-5FC8A4129D8A}" type="datetimeFigureOut">
               <a:rPr lang="fr-FR" smtClean="0"/>
-              <a:t>25/10/2022</a:t>
+              <a:t>28/10/2022</a:t>
             </a:fld>
             <a:endParaRPr lang="fr-FR"/>
           </a:p>
@@ -2173,7 +2172,7 @@
           <a:p>
             <a:fld id="{599F6D61-D8C0-4321-8F41-5FC8A4129D8A}" type="datetimeFigureOut">
               <a:rPr lang="fr-FR" smtClean="0"/>
-              <a:t>25/10/2022</a:t>
+              <a:t>28/10/2022</a:t>
             </a:fld>
             <a:endParaRPr lang="fr-FR"/>
           </a:p>
@@ -2450,7 +2449,7 @@
           <a:p>
             <a:fld id="{599F6D61-D8C0-4321-8F41-5FC8A4129D8A}" type="datetimeFigureOut">
               <a:rPr lang="fr-FR" smtClean="0"/>
-              <a:t>25/10/2022</a:t>
+              <a:t>28/10/2022</a:t>
             </a:fld>
             <a:endParaRPr lang="fr-FR"/>
           </a:p>
@@ -2707,7 +2706,7 @@
           <a:p>
             <a:fld id="{599F6D61-D8C0-4321-8F41-5FC8A4129D8A}" type="datetimeFigureOut">
               <a:rPr lang="fr-FR" smtClean="0"/>
-              <a:t>25/10/2022</a:t>
+              <a:t>28/10/2022</a:t>
             </a:fld>
             <a:endParaRPr lang="fr-FR"/>
           </a:p>
@@ -2920,7 +2919,7 @@
           <a:p>
             <a:fld id="{599F6D61-D8C0-4321-8F41-5FC8A4129D8A}" type="datetimeFigureOut">
               <a:rPr lang="fr-FR" smtClean="0"/>
-              <a:t>25/10/2022</a:t>
+              <a:t>28/10/2022</a:t>
             </a:fld>
             <a:endParaRPr lang="fr-FR"/>
           </a:p>
@@ -3405,31 +3404,7 @@
                 <a:latin typeface="Malgun Gothic" panose="020B0503020000020004" pitchFamily="34" charset="-127"/>
                 <a:ea typeface="Malgun Gothic" panose="020B0503020000020004" pitchFamily="34" charset="-127"/>
               </a:rPr>
-              <a:t>Passionné de nouvelles technologies, je propose de partager mon expertise </a:t>
-            </a:r>
-            <a:r>
-              <a:rPr lang="fr-FR" sz="1400" dirty="0" smtClean="0">
-                <a:solidFill>
-                  <a:schemeClr val="bg2">
-                    <a:lumMod val="50000"/>
-                  </a:schemeClr>
-                </a:solidFill>
-                <a:latin typeface="Malgun Gothic" panose="020B0503020000020004" pitchFamily="34" charset="-127"/>
-                <a:ea typeface="Malgun Gothic" panose="020B0503020000020004" pitchFamily="34" charset="-127"/>
-              </a:rPr>
-              <a:t>de 25 ans dans </a:t>
-            </a:r>
-            <a:r>
-              <a:rPr lang="fr-FR" sz="1400" dirty="0">
-                <a:solidFill>
-                  <a:schemeClr val="bg2">
-                    <a:lumMod val="50000"/>
-                  </a:schemeClr>
-                </a:solidFill>
-                <a:latin typeface="Malgun Gothic" panose="020B0503020000020004" pitchFamily="34" charset="-127"/>
-                <a:ea typeface="Malgun Gothic" panose="020B0503020000020004" pitchFamily="34" charset="-127"/>
-              </a:rPr>
-              <a:t>le développement informatique et le management de projets techniques</a:t>
+              <a:t>Passionné de nouvelles technologies, je propose de partager mon expertise de 25 ans dans le développement informatique et le management de projets techniques</a:t>
             </a:r>
           </a:p>
         </p:txBody>
@@ -4648,22 +4623,10 @@
                 <a:ea typeface="Malgun Gothic" panose="020B0503020000020004" pitchFamily="34" charset="-127"/>
                 <a:cs typeface="Angsana New" panose="02020603050405020304" pitchFamily="18" charset="-34"/>
               </a:rPr>
-              <a:t>:  </a:t>
-            </a:r>
-            <a:r>
-              <a:rPr lang="fr-FR" sz="1050" dirty="0" smtClean="0">
-                <a:solidFill>
-                  <a:srgbClr val="595959"/>
-                </a:solidFill>
-                <a:effectLst/>
-                <a:latin typeface="Malgun Gothic" panose="020B0503020000020004" pitchFamily="34" charset="-127"/>
-                <a:ea typeface="Malgun Gothic" panose="020B0503020000020004" pitchFamily="34" charset="-127"/>
-                <a:cs typeface="Angsana New" panose="02020603050405020304" pitchFamily="18" charset="-34"/>
-              </a:rPr>
-              <a:t> </a:t>
-            </a:r>
-            <a:r>
-              <a:rPr lang="fr-FR" sz="1050" dirty="0" smtClean="0">
+              <a:t>:   </a:t>
+            </a:r>
+            <a:r>
+              <a:rPr lang="fr-FR" sz="1050" dirty="0">
                 <a:solidFill>
                   <a:srgbClr val="0070C0"/>
                 </a:solidFill>
@@ -4672,19 +4635,7 @@
                 <a:ea typeface="Malgun Gothic" panose="020B0503020000020004" pitchFamily="34" charset="-127"/>
                 <a:cs typeface="Calibri" panose="020F0502020204030204" pitchFamily="34" charset="0"/>
               </a:rPr>
-              <a:t>Chef </a:t>
-            </a:r>
-            <a:r>
-              <a:rPr lang="fr-FR" sz="1050" dirty="0">
-                <a:solidFill>
-                  <a:srgbClr val="0070C0"/>
-                </a:solidFill>
-                <a:effectLst/>
-                <a:latin typeface="Malgun Gothic" panose="020B0503020000020004" pitchFamily="34" charset="-127"/>
-                <a:ea typeface="Malgun Gothic" panose="020B0503020000020004" pitchFamily="34" charset="-127"/>
-                <a:cs typeface="Calibri" panose="020F0502020204030204" pitchFamily="34" charset="0"/>
-              </a:rPr>
-              <a:t>de projets R&amp;D</a:t>
+              <a:t>Chef de projets R&amp;D</a:t>
             </a:r>
             <a:r>
               <a:rPr lang="fr-FR" sz="1050" dirty="0">
@@ -4745,7 +4696,7 @@
           <a:p>
             <a:pPr algn="just"/>
             <a:r>
-              <a:rPr lang="fr-FR" sz="1100" b="1" cap="small" dirty="0" smtClean="0">
+              <a:rPr lang="fr-FR" sz="1100" b="1" cap="small" dirty="0">
                 <a:solidFill>
                   <a:srgbClr val="4F81BD"/>
                 </a:solidFill>
@@ -4754,19 +4705,7 @@
                 <a:ea typeface="Malgun Gothic" panose="020B0503020000020004" pitchFamily="34" charset="-127"/>
                 <a:cs typeface="Angsana New" panose="02020603050405020304" pitchFamily="18" charset="-34"/>
               </a:rPr>
-              <a:t>Cloud </a:t>
-            </a:r>
-            <a:r>
-              <a:rPr lang="fr-FR" sz="1100" b="1" cap="small" dirty="0">
-                <a:solidFill>
-                  <a:srgbClr val="4F81BD"/>
-                </a:solidFill>
-                <a:effectLst/>
-                <a:latin typeface="Malgun Gothic" panose="020B0503020000020004" pitchFamily="34" charset="-127"/>
-                <a:ea typeface="Malgun Gothic" panose="020B0503020000020004" pitchFamily="34" charset="-127"/>
-                <a:cs typeface="Angsana New" panose="02020603050405020304" pitchFamily="18" charset="-34"/>
-              </a:rPr>
-              <a:t>: </a:t>
+              <a:t>Cloud : </a:t>
             </a:r>
             <a:r>
               <a:rPr lang="fr-FR" sz="1050" cap="small" dirty="0">
@@ -4837,7 +4776,7 @@
           </a:p>
           <a:p>
             <a:r>
-              <a:rPr lang="fr-FR" sz="1100" b="1" cap="small" dirty="0" smtClean="0">
+              <a:rPr lang="fr-FR" sz="1100" b="1" cap="small" dirty="0">
                 <a:solidFill>
                   <a:srgbClr val="4F81BD"/>
                 </a:solidFill>
@@ -5080,7 +5019,7 @@
         <p:spPr>
           <a:xfrm>
             <a:off x="0" y="3907990"/>
-            <a:ext cx="2298733" cy="1177245"/>
+            <a:ext cx="2298733" cy="1331134"/>
           </a:xfrm>
           <a:prstGeom prst="rect">
             <a:avLst/>
@@ -5109,10 +5048,13 @@
             </a:r>
           </a:p>
           <a:p>
-            <a:endParaRPr lang="fr-FR" sz="1000" dirty="0" smtClean="0">
-              <a:latin typeface="Malgun Gothic" panose="020B0503020000020004" pitchFamily="34" charset="-127"/>
-              <a:ea typeface="Malgun Gothic" panose="020B0503020000020004" pitchFamily="34" charset="-127"/>
-            </a:endParaRPr>
+            <a:r>
+              <a:rPr lang="fr-FR" sz="1000" dirty="0">
+                <a:latin typeface="Malgun Gothic" panose="020B0503020000020004" pitchFamily="34" charset="-127"/>
+                <a:ea typeface="Malgun Gothic" panose="020B0503020000020004" pitchFamily="34" charset="-127"/>
+              </a:rPr>
+              <a:t>53 ans 1 enfant</a:t>
+            </a:r>
           </a:p>
           <a:p>
             <a:endParaRPr lang="fr-FR" sz="1000" dirty="0">
@@ -5121,19 +5063,25 @@
             </a:endParaRPr>
           </a:p>
           <a:p>
-            <a:endParaRPr lang="fr-FR" sz="1000" dirty="0" smtClean="0">
-              <a:latin typeface="Malgun Gothic" panose="020B0503020000020004" pitchFamily="34" charset="-127"/>
-              <a:ea typeface="Malgun Gothic" panose="020B0503020000020004" pitchFamily="34" charset="-127"/>
-            </a:endParaRPr>
-          </a:p>
-          <a:p>
             <a:endParaRPr lang="fr-FR" sz="1000" dirty="0">
               <a:latin typeface="Malgun Gothic" panose="020B0503020000020004" pitchFamily="34" charset="-127"/>
               <a:ea typeface="Malgun Gothic" panose="020B0503020000020004" pitchFamily="34" charset="-127"/>
             </a:endParaRPr>
           </a:p>
           <a:p>
-            <a:endParaRPr lang="fr-FR" sz="1000" dirty="0" smtClean="0">
+            <a:endParaRPr lang="fr-FR" sz="1000" dirty="0">
+              <a:latin typeface="Malgun Gothic" panose="020B0503020000020004" pitchFamily="34" charset="-127"/>
+              <a:ea typeface="Malgun Gothic" panose="020B0503020000020004" pitchFamily="34" charset="-127"/>
+            </a:endParaRPr>
+          </a:p>
+          <a:p>
+            <a:endParaRPr lang="fr-FR" sz="1000" dirty="0">
+              <a:latin typeface="Malgun Gothic" panose="020B0503020000020004" pitchFamily="34" charset="-127"/>
+              <a:ea typeface="Malgun Gothic" panose="020B0503020000020004" pitchFamily="34" charset="-127"/>
+            </a:endParaRPr>
+          </a:p>
+          <a:p>
+            <a:endParaRPr lang="fr-FR" sz="1000" dirty="0">
               <a:latin typeface="Malgun Gothic" panose="020B0503020000020004" pitchFamily="34" charset="-127"/>
               <a:ea typeface="Malgun Gothic" panose="020B0503020000020004" pitchFamily="34" charset="-127"/>
             </a:endParaRPr>
@@ -5149,13 +5097,13 @@
           <p:nvPr>
             <p:extLst>
               <p:ext uri="{D42A27DB-BD31-4B8C-83A1-F6EECF244321}">
-                <p14:modId xmlns:p14="http://schemas.microsoft.com/office/powerpoint/2010/main" val="3529963984"/>
+                <p14:modId xmlns:p14="http://schemas.microsoft.com/office/powerpoint/2010/main" val="2322767414"/>
               </p:ext>
             </p:extLst>
           </p:nvPr>
         </p:nvGraphicFramePr>
         <p:xfrm>
-          <a:off x="63567" y="4272227"/>
+          <a:off x="72202" y="4448847"/>
           <a:ext cx="2061277" cy="805607"/>
         </p:xfrm>
         <a:graphic>
@@ -5222,7 +5170,7 @@
                         <a:defRPr/>
                       </a:pPr>
                       <a:r>
-                        <a:rPr lang="fr-FR" sz="800" b="0" dirty="0" smtClean="0">
+                        <a:rPr lang="fr-FR" sz="800" b="0" dirty="0">
                           <a:solidFill>
                             <a:schemeClr val="tx1"/>
                           </a:solidFill>
@@ -5285,7 +5233,7 @@
                         <a:defRPr/>
                       </a:pPr>
                       <a:r>
-                        <a:rPr lang="fr-FR" sz="800" b="0" dirty="0" smtClean="0">
+                        <a:rPr lang="fr-FR" sz="800" b="0" dirty="0">
                           <a:solidFill>
                             <a:schemeClr val="tx1"/>
                           </a:solidFill>
@@ -5348,7 +5296,7 @@
                         <a:defRPr/>
                       </a:pPr>
                       <a:r>
-                        <a:rPr lang="fr-FR" sz="800" b="0" dirty="0" smtClean="0">
+                        <a:rPr lang="fr-FR" sz="800" b="0" dirty="0">
                           <a:solidFill>
                             <a:schemeClr val="tx1"/>
                           </a:solidFill>
@@ -5358,7 +5306,7 @@
                         <a:t>linkedin.com/in/</a:t>
                       </a:r>
                       <a:r>
-                        <a:rPr lang="fr-FR" sz="800" b="0" dirty="0" err="1" smtClean="0">
+                        <a:rPr lang="fr-FR" sz="800" b="0" dirty="0" err="1">
                           <a:solidFill>
                             <a:schemeClr val="tx1"/>
                           </a:solidFill>
@@ -5368,7 +5316,7 @@
                         <a:t>frederic</a:t>
                       </a:r>
                       <a:r>
-                        <a:rPr lang="fr-FR" sz="800" b="0" dirty="0" smtClean="0">
+                        <a:rPr lang="fr-FR" sz="800" b="0" dirty="0">
                           <a:solidFill>
                             <a:schemeClr val="tx1"/>
                           </a:solidFill>
@@ -5414,7 +5362,7 @@
         </p:blipFill>
         <p:spPr bwMode="auto">
           <a:xfrm>
-            <a:off x="94262" y="4523080"/>
+            <a:off x="94262" y="4681755"/>
             <a:ext cx="242546" cy="181712"/>
           </a:xfrm>
           <a:prstGeom prst="rect">
@@ -5455,7 +5403,7 @@
         </p:blipFill>
         <p:spPr bwMode="auto">
           <a:xfrm>
-            <a:off x="121372" y="4730653"/>
+            <a:off x="121372" y="4889328"/>
             <a:ext cx="166265" cy="166265"/>
           </a:xfrm>
           <a:prstGeom prst="rect">
@@ -5496,7 +5444,7 @@
         </p:blipFill>
         <p:spPr bwMode="auto">
           <a:xfrm>
-            <a:off x="72202" y="4272227"/>
+            <a:off x="72202" y="4430902"/>
             <a:ext cx="264606" cy="250852"/>
           </a:xfrm>
           <a:prstGeom prst="rect">
@@ -5740,7 +5688,7 @@
           <a:p>
             <a:pPr algn="just"/>
             <a:r>
-              <a:rPr lang="fr-FR" sz="1050" b="1" cap="small" dirty="0" smtClean="0">
+              <a:rPr lang="fr-FR" sz="1050" b="1" cap="small" dirty="0">
                 <a:solidFill>
                   <a:srgbClr val="00000A"/>
                 </a:solidFill>
@@ -5748,18 +5696,7 @@
                 <a:ea typeface="Malgun Gothic" panose="020B0503020000020004" pitchFamily="34" charset="-127"/>
                 <a:cs typeface="Cordia New" panose="020B0304020202020204" pitchFamily="34" charset="-34"/>
               </a:rPr>
-              <a:t>Dernier </a:t>
-            </a:r>
-            <a:r>
-              <a:rPr lang="fr-FR" sz="1050" b="1" cap="small" dirty="0">
-                <a:solidFill>
-                  <a:srgbClr val="00000A"/>
-                </a:solidFill>
-                <a:latin typeface="Malgun Gothic" panose="020B0503020000020004" pitchFamily="34" charset="-127"/>
-                <a:ea typeface="Malgun Gothic" panose="020B0503020000020004" pitchFamily="34" charset="-127"/>
-                <a:cs typeface="Cordia New" panose="020B0304020202020204" pitchFamily="34" charset="-34"/>
-              </a:rPr>
-              <a:t>Poste occupé </a:t>
+              <a:t>Dernier Poste occupé </a:t>
             </a:r>
             <a:r>
               <a:rPr lang="fr-FR" sz="1050" dirty="0">
@@ -5918,7 +5855,7 @@
               </a:tabLst>
             </a:pPr>
             <a:r>
-              <a:rPr lang="fr-FR" sz="1050" b="1" i="1" dirty="0" smtClean="0">
+              <a:rPr lang="fr-FR" sz="1050" b="1" i="1" dirty="0">
                 <a:solidFill>
                   <a:srgbClr val="0070C0"/>
                 </a:solidFill>
@@ -5927,19 +5864,7 @@
                 <a:ea typeface="Malgun Gothic" panose="020B0503020000020004" pitchFamily="34" charset="-127"/>
                 <a:cs typeface="Calibri" panose="020F0502020204030204" pitchFamily="34" charset="0"/>
               </a:rPr>
-              <a:t>DEVOPS </a:t>
-            </a:r>
-            <a:r>
-              <a:rPr lang="fr-FR" sz="1050" b="1" i="1" dirty="0">
-                <a:solidFill>
-                  <a:srgbClr val="0070C0"/>
-                </a:solidFill>
-                <a:effectLst/>
-                <a:latin typeface="Malgun Gothic" panose="020B0503020000020004" pitchFamily="34" charset="-127"/>
-                <a:ea typeface="Malgun Gothic" panose="020B0503020000020004" pitchFamily="34" charset="-127"/>
-                <a:cs typeface="Calibri" panose="020F0502020204030204" pitchFamily="34" charset="0"/>
-              </a:rPr>
-              <a:t>SUR GRAPHTALK AIA </a:t>
+              <a:t>DEVOPS SUR GRAPHTALK AIA </a:t>
             </a:r>
             <a:r>
               <a:rPr lang="fr-FR" sz="1050" dirty="0">
@@ -5971,7 +5896,7 @@
               </a:tabLst>
             </a:pPr>
             <a:r>
-              <a:rPr lang="fr-FR" sz="1050" b="1" i="1" dirty="0" smtClean="0">
+              <a:rPr lang="fr-FR" sz="1050" b="1" i="1" dirty="0">
                 <a:solidFill>
                   <a:srgbClr val="0070C0"/>
                 </a:solidFill>
@@ -5980,19 +5905,7 @@
                 <a:ea typeface="Malgun Gothic" panose="020B0503020000020004" pitchFamily="34" charset="-127"/>
                 <a:cs typeface="Calibri" panose="020F0502020204030204" pitchFamily="34" charset="0"/>
               </a:rPr>
-              <a:t>INDUSTRIALISATION </a:t>
-            </a:r>
-            <a:r>
-              <a:rPr lang="fr-FR" sz="1050" b="1" i="1" dirty="0">
-                <a:solidFill>
-                  <a:srgbClr val="0070C0"/>
-                </a:solidFill>
-                <a:effectLst/>
-                <a:latin typeface="Malgun Gothic" panose="020B0503020000020004" pitchFamily="34" charset="-127"/>
-                <a:ea typeface="Malgun Gothic" panose="020B0503020000020004" pitchFamily="34" charset="-127"/>
-                <a:cs typeface="Calibri" panose="020F0502020204030204" pitchFamily="34" charset="0"/>
-              </a:rPr>
-              <a:t>DE L’INSTALLATION DU LOGICIEL GRAPHTALK </a:t>
+              <a:t>INDUSTRIALISATION DE L’INSTALLATION DU LOGICIEL GRAPHTALK </a:t>
             </a:r>
           </a:p>
           <a:p>
@@ -6003,7 +5916,7 @@
               </a:tabLst>
             </a:pPr>
             <a:r>
-              <a:rPr lang="fr-FR" sz="1050" b="1" i="1" dirty="0" smtClean="0">
+              <a:rPr lang="fr-FR" sz="1050" b="1" i="1" dirty="0">
                 <a:solidFill>
                   <a:srgbClr val="595959"/>
                 </a:solidFill>
@@ -6012,19 +5925,7 @@
                 <a:ea typeface="Malgun Gothic" panose="020B0503020000020004" pitchFamily="34" charset="-127"/>
                 <a:cs typeface="Calibri" panose="020F0502020204030204" pitchFamily="34" charset="0"/>
               </a:rPr>
-              <a:t>Responsable </a:t>
-            </a:r>
-            <a:r>
-              <a:rPr lang="fr-FR" sz="1050" b="1" i="1" dirty="0">
-                <a:solidFill>
-                  <a:srgbClr val="595959"/>
-                </a:solidFill>
-                <a:effectLst/>
-                <a:latin typeface="Malgun Gothic" panose="020B0503020000020004" pitchFamily="34" charset="-127"/>
-                <a:ea typeface="Malgun Gothic" panose="020B0503020000020004" pitchFamily="34" charset="-127"/>
-                <a:cs typeface="Calibri" panose="020F0502020204030204" pitchFamily="34" charset="0"/>
-              </a:rPr>
-              <a:t>du projet Delivery Manager 2007-2014 : équipe de 5 personnes : </a:t>
+              <a:t>Responsable du projet Delivery Manager 2007-2014 : équipe de 5 personnes : </a:t>
             </a:r>
             <a:r>
               <a:rPr lang="fr-FR" sz="1050" dirty="0">
@@ -6119,7 +6020,7 @@
               </a:tabLst>
             </a:pPr>
             <a:r>
-              <a:rPr lang="fr-FR" sz="1050" b="1" i="1" dirty="0" smtClean="0">
+              <a:rPr lang="fr-FR" sz="1050" b="1" i="1" dirty="0">
                 <a:solidFill>
                   <a:srgbClr val="0070C0"/>
                 </a:solidFill>
@@ -6128,19 +6029,7 @@
                 <a:ea typeface="Malgun Gothic" panose="020B0503020000020004" pitchFamily="34" charset="-127"/>
                 <a:cs typeface="Calibri" panose="020F0502020204030204" pitchFamily="34" charset="0"/>
               </a:rPr>
-              <a:t>PROJETS </a:t>
-            </a:r>
-            <a:r>
-              <a:rPr lang="fr-FR" sz="1050" b="1" i="1" dirty="0">
-                <a:solidFill>
-                  <a:srgbClr val="0070C0"/>
-                </a:solidFill>
-                <a:effectLst/>
-                <a:latin typeface="Malgun Gothic" panose="020B0503020000020004" pitchFamily="34" charset="-127"/>
-                <a:ea typeface="Malgun Gothic" panose="020B0503020000020004" pitchFamily="34" charset="-127"/>
-                <a:cs typeface="Calibri" panose="020F0502020204030204" pitchFamily="34" charset="0"/>
-              </a:rPr>
-              <a:t>JOB MANAGER et IPE SOUS GRAPHTALK AIA pour la gestion de production 2003-2007</a:t>
+              <a:t>PROJETS JOB MANAGER et IPE SOUS GRAPHTALK AIA pour la gestion de production 2003-2007</a:t>
             </a:r>
           </a:p>
           <a:p>
@@ -6151,7 +6040,7 @@
               </a:tabLst>
             </a:pPr>
             <a:r>
-              <a:rPr lang="fr-FR" sz="1050" b="1" i="1" dirty="0" smtClean="0">
+              <a:rPr lang="fr-FR" sz="1050" b="1" i="1" dirty="0">
                 <a:solidFill>
                   <a:srgbClr val="595959"/>
                 </a:solidFill>
@@ -6160,19 +6049,7 @@
                 <a:ea typeface="Malgun Gothic" panose="020B0503020000020004" pitchFamily="34" charset="-127"/>
                 <a:cs typeface="Angsana New" panose="02020603050405020304" pitchFamily="18" charset="-34"/>
               </a:rPr>
-              <a:t>Responsable </a:t>
-            </a:r>
-            <a:r>
-              <a:rPr lang="fr-FR" sz="1050" b="1" i="1" dirty="0">
-                <a:solidFill>
-                  <a:srgbClr val="595959"/>
-                </a:solidFill>
-                <a:effectLst/>
-                <a:latin typeface="Malgun Gothic" panose="020B0503020000020004" pitchFamily="34" charset="-127"/>
-                <a:ea typeface="Malgun Gothic" panose="020B0503020000020004" pitchFamily="34" charset="-127"/>
-                <a:cs typeface="Angsana New" panose="02020603050405020304" pitchFamily="18" charset="-34"/>
-              </a:rPr>
-              <a:t>des projets : équipe de 8 personnes en France et Bulgarie : </a:t>
+              <a:t>Responsable des projets : équipe de 8 personnes en France et Bulgarie : </a:t>
             </a:r>
             <a:r>
               <a:rPr lang="fr-FR" sz="1050" dirty="0">
@@ -6218,7 +6095,7 @@
               </a:tabLst>
             </a:pPr>
             <a:r>
-              <a:rPr lang="fr-FR" sz="1050" b="1" i="1" dirty="0" smtClean="0">
+              <a:rPr lang="fr-FR" sz="1050" b="1" i="1" dirty="0">
                 <a:solidFill>
                   <a:srgbClr val="0070C0"/>
                 </a:solidFill>
@@ -6227,19 +6104,7 @@
                 <a:ea typeface="Malgun Gothic" panose="020B0503020000020004" pitchFamily="34" charset="-127"/>
                 <a:cs typeface="Calibri" panose="020F0502020204030204" pitchFamily="34" charset="0"/>
               </a:rPr>
-              <a:t>PROJET </a:t>
-            </a:r>
-            <a:r>
-              <a:rPr lang="fr-FR" sz="1050" b="1" i="1" dirty="0">
-                <a:solidFill>
-                  <a:srgbClr val="0070C0"/>
-                </a:solidFill>
-                <a:effectLst/>
-                <a:latin typeface="Malgun Gothic" panose="020B0503020000020004" pitchFamily="34" charset="-127"/>
-                <a:ea typeface="Malgun Gothic" panose="020B0503020000020004" pitchFamily="34" charset="-127"/>
-                <a:cs typeface="Calibri" panose="020F0502020204030204" pitchFamily="34" charset="0"/>
-              </a:rPr>
-              <a:t>INTERFACE GRAPHIQUE (GUI) DE GRAPHTALK AIA 2000-2003</a:t>
+              <a:t>PROJET INTERFACE GRAPHIQUE (GUI) DE GRAPHTALK AIA 2000-2003</a:t>
             </a:r>
           </a:p>
           <a:p>
@@ -6250,7 +6115,7 @@
               </a:tabLst>
             </a:pPr>
             <a:r>
-              <a:rPr lang="fr-FR" sz="1050" b="1" i="1" dirty="0" smtClean="0">
+              <a:rPr lang="fr-FR" sz="1050" b="1" i="1" dirty="0">
                 <a:solidFill>
                   <a:srgbClr val="595959"/>
                 </a:solidFill>
@@ -6259,19 +6124,7 @@
                 <a:ea typeface="Malgun Gothic" panose="020B0503020000020004" pitchFamily="34" charset="-127"/>
                 <a:cs typeface="Angsana New" panose="02020603050405020304" pitchFamily="18" charset="-34"/>
               </a:rPr>
-              <a:t>Responsable </a:t>
-            </a:r>
-            <a:r>
-              <a:rPr lang="fr-FR" sz="1050" b="1" i="1" dirty="0">
-                <a:solidFill>
-                  <a:srgbClr val="595959"/>
-                </a:solidFill>
-                <a:effectLst/>
-                <a:latin typeface="Malgun Gothic" panose="020B0503020000020004" pitchFamily="34" charset="-127"/>
-                <a:ea typeface="Malgun Gothic" panose="020B0503020000020004" pitchFamily="34" charset="-127"/>
-                <a:cs typeface="Angsana New" panose="02020603050405020304" pitchFamily="18" charset="-34"/>
-              </a:rPr>
-              <a:t>du projet : équipe de 5 personnes en France : </a:t>
+              <a:t>Responsable du projet : équipe de 5 personnes en France : </a:t>
             </a:r>
             <a:r>
               <a:rPr lang="fr-FR" sz="1050" dirty="0">
@@ -6353,7 +6206,7 @@
           <a:p>
             <a:pPr algn="just"/>
             <a:r>
-              <a:rPr lang="fr-FR" sz="1050" b="1" cap="small" dirty="0" smtClean="0">
+              <a:rPr lang="fr-FR" sz="1050" b="1" cap="small" dirty="0">
                 <a:solidFill>
                   <a:srgbClr val="00000A"/>
                 </a:solidFill>
@@ -6361,18 +6214,7 @@
                 <a:ea typeface="Malgun Gothic" panose="020B0503020000020004" pitchFamily="34" charset="-127"/>
                 <a:cs typeface="Cordia New" panose="020B0304020202020204" pitchFamily="34" charset="-34"/>
               </a:rPr>
-              <a:t>Postes </a:t>
-            </a:r>
-            <a:r>
-              <a:rPr lang="fr-FR" sz="1050" b="1" cap="small" dirty="0">
-                <a:solidFill>
-                  <a:srgbClr val="00000A"/>
-                </a:solidFill>
-                <a:latin typeface="Malgun Gothic" panose="020B0503020000020004" pitchFamily="34" charset="-127"/>
-                <a:ea typeface="Malgun Gothic" panose="020B0503020000020004" pitchFamily="34" charset="-127"/>
-                <a:cs typeface="Cordia New" panose="020B0304020202020204" pitchFamily="34" charset="-34"/>
-              </a:rPr>
-              <a:t>occupés </a:t>
+              <a:t>Postes occupés </a:t>
             </a:r>
             <a:r>
               <a:rPr lang="fr-FR" sz="1050" dirty="0">
@@ -6446,7 +6288,7 @@
               </a:tabLst>
             </a:pPr>
             <a:r>
-              <a:rPr lang="fr-FR" sz="1050" dirty="0" smtClean="0">
+              <a:rPr lang="fr-FR" sz="1050" dirty="0">
                 <a:solidFill>
                   <a:srgbClr val="0070C0"/>
                 </a:solidFill>
@@ -6455,19 +6297,7 @@
                 <a:ea typeface="Malgun Gothic" panose="020B0503020000020004" pitchFamily="34" charset="-127"/>
                 <a:cs typeface="Calibri" panose="020F0502020204030204" pitchFamily="34" charset="0"/>
               </a:rPr>
-              <a:t>Responsable </a:t>
-            </a:r>
-            <a:r>
-              <a:rPr lang="fr-FR" sz="1050" dirty="0">
-                <a:solidFill>
-                  <a:srgbClr val="0070C0"/>
-                </a:solidFill>
-                <a:effectLst/>
-                <a:latin typeface="Malgun Gothic" panose="020B0503020000020004" pitchFamily="34" charset="-127"/>
-                <a:ea typeface="Malgun Gothic" panose="020B0503020000020004" pitchFamily="34" charset="-127"/>
-                <a:cs typeface="Calibri" panose="020F0502020204030204" pitchFamily="34" charset="0"/>
-              </a:rPr>
-              <a:t>du projet </a:t>
+              <a:t>Responsable du projet </a:t>
             </a:r>
             <a:r>
               <a:rPr lang="fr-FR" sz="1050" dirty="0" err="1">
@@ -6502,7 +6332,7 @@
               </a:tabLst>
             </a:pPr>
             <a:r>
-              <a:rPr lang="fr-FR" sz="1050" dirty="0" smtClean="0">
+              <a:rPr lang="fr-FR" sz="1050" dirty="0">
                 <a:solidFill>
                   <a:srgbClr val="0070C0"/>
                 </a:solidFill>
@@ -6511,19 +6341,7 @@
                 <a:ea typeface="Malgun Gothic" panose="020B0503020000020004" pitchFamily="34" charset="-127"/>
                 <a:cs typeface="Calibri" panose="020F0502020204030204" pitchFamily="34" charset="0"/>
               </a:rPr>
-              <a:t>Développement </a:t>
-            </a:r>
-            <a:r>
-              <a:rPr lang="fr-FR" sz="1050" dirty="0">
-                <a:solidFill>
-                  <a:srgbClr val="0070C0"/>
-                </a:solidFill>
-                <a:effectLst/>
-                <a:latin typeface="Malgun Gothic" panose="020B0503020000020004" pitchFamily="34" charset="-127"/>
-                <a:ea typeface="Malgun Gothic" panose="020B0503020000020004" pitchFamily="34" charset="-127"/>
-                <a:cs typeface="Calibri" panose="020F0502020204030204" pitchFamily="34" charset="0"/>
-              </a:rPr>
-              <a:t>et Exploitation</a:t>
+              <a:t>Développement et Exploitation</a:t>
             </a:r>
             <a:r>
               <a:rPr lang="fr-FR" sz="1050" dirty="0">
@@ -6769,7 +6587,7 @@
           <a:p>
             <a:pPr algn="just"/>
             <a:r>
-              <a:rPr lang="fr-FR" sz="1050" b="1" cap="all" dirty="0" smtClean="0">
+              <a:rPr lang="fr-FR" sz="1050" b="1" cap="all" dirty="0">
                 <a:solidFill>
                   <a:srgbClr val="404040"/>
                 </a:solidFill>
@@ -6781,7 +6599,7 @@
               <a:t>DESS </a:t>
             </a:r>
             <a:r>
-              <a:rPr lang="fr-FR" sz="1050" b="1" cap="all" dirty="0" err="1" smtClean="0">
+              <a:rPr lang="fr-FR" sz="1050" b="1" cap="all" dirty="0" err="1">
                 <a:solidFill>
                   <a:srgbClr val="404040"/>
                 </a:solidFill>
@@ -6793,7 +6611,7 @@
               <a:t>ing</a:t>
             </a:r>
             <a:r>
-              <a:rPr lang="fr-FR" sz="1050" b="1" cap="all" dirty="0" smtClean="0">
+              <a:rPr lang="fr-FR" sz="1050" b="1" cap="all" dirty="0">
                 <a:solidFill>
                   <a:srgbClr val="404040"/>
                 </a:solidFill>
@@ -6805,7 +6623,7 @@
               <a:t>. </a:t>
             </a:r>
             <a:r>
-              <a:rPr lang="fr-FR" sz="1050" b="1" cap="all" dirty="0" err="1" smtClean="0">
+              <a:rPr lang="fr-FR" sz="1050" b="1" cap="all" dirty="0" err="1">
                 <a:solidFill>
                   <a:srgbClr val="404040"/>
                 </a:solidFill>
@@ -6817,7 +6635,7 @@
               <a:t>mathematique</a:t>
             </a:r>
             <a:r>
-              <a:rPr lang="fr-FR" sz="1050" b="1" cap="all" dirty="0" smtClean="0">
+              <a:rPr lang="fr-FR" sz="1050" b="1" cap="all" dirty="0">
                 <a:solidFill>
                   <a:srgbClr val="404040"/>
                 </a:solidFill>
@@ -6829,7 +6647,7 @@
               <a:t> (Master 2), </a:t>
             </a:r>
             <a:r>
-              <a:rPr lang="fr-FR" sz="1050" b="1" cap="all" dirty="0" err="1" smtClean="0">
+              <a:rPr lang="fr-FR" sz="1050" b="1" cap="all" dirty="0" err="1">
                 <a:solidFill>
                   <a:srgbClr val="404040"/>
                 </a:solidFill>
@@ -6841,7 +6659,7 @@
               <a:t>opt</a:t>
             </a:r>
             <a:r>
-              <a:rPr lang="fr-FR" sz="1050" b="1" cap="all" dirty="0" smtClean="0">
+              <a:rPr lang="fr-FR" sz="1050" b="1" cap="all" dirty="0">
                 <a:solidFill>
                   <a:srgbClr val="404040"/>
                 </a:solidFill>
@@ -6853,7 +6671,7 @@
               <a:t>. courbes surfaces &amp; images</a:t>
             </a:r>
             <a:r>
-              <a:rPr lang="fr-FR" sz="1050" b="0" cap="all" dirty="0" smtClean="0">
+              <a:rPr lang="fr-FR" sz="1050" b="0" cap="all" dirty="0">
                 <a:solidFill>
                   <a:srgbClr val="404040"/>
                 </a:solidFill>
@@ -6865,7 +6683,7 @@
               <a:t>, </a:t>
             </a:r>
             <a:r>
-              <a:rPr lang="fr-FR" sz="1050" b="0" cap="small" dirty="0" smtClean="0">
+              <a:rPr lang="fr-FR" sz="1050" b="0" cap="small" dirty="0">
                 <a:solidFill>
                   <a:srgbClr val="404040"/>
                 </a:solidFill>
@@ -6877,7 +6695,7 @@
               <a:t>UNIV.  J. FOURIER, Grenoble – </a:t>
             </a:r>
             <a:r>
-              <a:rPr lang="fr-FR" sz="1050" b="0" cap="small" dirty="0" err="1" smtClean="0">
+              <a:rPr lang="fr-FR" sz="1050" b="0" cap="small" dirty="0" err="1">
                 <a:solidFill>
                   <a:srgbClr val="404040"/>
                 </a:solidFill>
@@ -6889,7 +6707,7 @@
               <a:t>Obt</a:t>
             </a:r>
             <a:r>
-              <a:rPr lang="fr-FR" sz="1050" b="0" cap="small" dirty="0" smtClean="0">
+              <a:rPr lang="fr-FR" sz="1050" b="0" cap="small" dirty="0">
                 <a:solidFill>
                   <a:srgbClr val="404040"/>
                 </a:solidFill>
@@ -6900,7 +6718,7 @@
               </a:rPr>
               <a:t>. 1996</a:t>
             </a:r>
-            <a:endParaRPr lang="fr-FR" sz="1050" b="1" cap="all" dirty="0" smtClean="0">
+            <a:endParaRPr lang="fr-FR" sz="1050" b="1" cap="all" dirty="0">
               <a:solidFill>
                 <a:srgbClr val="404040"/>
               </a:solidFill>
@@ -6913,7 +6731,7 @@
           <a:p>
             <a:pPr algn="just"/>
             <a:r>
-              <a:rPr lang="fr-FR" sz="1050" b="1" cap="all" dirty="0" smtClean="0">
+              <a:rPr lang="fr-FR" sz="1050" b="1" cap="all" dirty="0">
                 <a:solidFill>
                   <a:srgbClr val="404040"/>
                 </a:solidFill>
@@ -6925,7 +6743,7 @@
               <a:t>maîtrise GENIE MATH. &amp; INFORMATIQUE, / Ingénieur maître en MATH. APPLIQ. &amp; INFORMATIQUE</a:t>
             </a:r>
             <a:r>
-              <a:rPr lang="fr-FR" sz="1050" b="0" cap="small" dirty="0" smtClean="0">
+              <a:rPr lang="fr-FR" sz="1050" b="0" cap="small" dirty="0">
                 <a:solidFill>
                   <a:srgbClr val="404040"/>
                 </a:solidFill>
@@ -6937,7 +6755,7 @@
               <a:t>, UNIV. J. FOURIER, Grenoble – </a:t>
             </a:r>
             <a:r>
-              <a:rPr lang="fr-FR" sz="1050" b="0" cap="small" dirty="0" err="1" smtClean="0">
+              <a:rPr lang="fr-FR" sz="1050" b="0" cap="small" dirty="0" err="1">
                 <a:solidFill>
                   <a:srgbClr val="404040"/>
                 </a:solidFill>
@@ -6949,7 +6767,7 @@
               <a:t>Obt</a:t>
             </a:r>
             <a:r>
-              <a:rPr lang="fr-FR" sz="1050" b="0" cap="small" dirty="0" smtClean="0">
+              <a:rPr lang="fr-FR" sz="1050" b="0" cap="small" dirty="0">
                 <a:solidFill>
                   <a:srgbClr val="404040"/>
                 </a:solidFill>
@@ -7001,7 +6819,7 @@
           <a:lstStyle/>
           <a:p>
             <a:r>
-              <a:rPr lang="fr-FR" sz="1400" b="1" dirty="0" smtClean="0">
+              <a:rPr lang="fr-FR" sz="1400" b="1" dirty="0">
                 <a:solidFill>
                   <a:schemeClr val="accent1">
                     <a:lumMod val="50000"/>
@@ -7010,29 +6828,8 @@
                 <a:latin typeface="Malgun Gothic" panose="020B0503020000020004" pitchFamily="34" charset="-127"/>
                 <a:ea typeface="Malgun Gothic" panose="020B0503020000020004" pitchFamily="34" charset="-127"/>
               </a:rPr>
-              <a:t>D</a:t>
-            </a:r>
-            <a:r>
-              <a:rPr lang="fr-FR" sz="1400" b="1" dirty="0" smtClean="0">
-                <a:solidFill>
-                  <a:schemeClr val="accent1">
-                    <a:lumMod val="50000"/>
-                  </a:schemeClr>
-                </a:solidFill>
-                <a:latin typeface="Malgun Gothic" panose="020B0503020000020004" pitchFamily="34" charset="-127"/>
-                <a:ea typeface="Malgun Gothic" panose="020B0503020000020004" pitchFamily="34" charset="-127"/>
-              </a:rPr>
-              <a:t>ivers</a:t>
-            </a:r>
-            <a:endParaRPr lang="fr-FR" sz="1400" b="1" dirty="0">
-              <a:solidFill>
-                <a:schemeClr val="accent1">
-                  <a:lumMod val="50000"/>
-                </a:schemeClr>
-              </a:solidFill>
-              <a:latin typeface="Malgun Gothic" panose="020B0503020000020004" pitchFamily="34" charset="-127"/>
-              <a:ea typeface="Malgun Gothic" panose="020B0503020000020004" pitchFamily="34" charset="-127"/>
-            </a:endParaRPr>
+              <a:t>Divers</a:t>
+            </a:r>
           </a:p>
         </p:txBody>
       </p:sp>
@@ -7123,19 +6920,8 @@
                 <a:latin typeface="Malgun Gothic" panose="020B0503020000020004" pitchFamily="34" charset="-127"/>
                 <a:ea typeface="Malgun Gothic" panose="020B0503020000020004" pitchFamily="34" charset="-127"/>
               </a:rPr>
-              <a:t>Sport : ancien nageur de compétition (niveau national) ; pratique de la course à pied en compétition</a:t>
-            </a:r>
-            <a:r>
-              <a:rPr lang="fr-FR" sz="1050" dirty="0" smtClean="0">
-                <a:latin typeface="Malgun Gothic" panose="020B0503020000020004" pitchFamily="34" charset="-127"/>
-                <a:ea typeface="Malgun Gothic" panose="020B0503020000020004" pitchFamily="34" charset="-127"/>
-              </a:rPr>
-              <a:t>.</a:t>
-            </a:r>
-            <a:endParaRPr lang="fr-FR" sz="1050" dirty="0">
-              <a:latin typeface="Malgun Gothic" panose="020B0503020000020004" pitchFamily="34" charset="-127"/>
-              <a:ea typeface="Malgun Gothic" panose="020B0503020000020004" pitchFamily="34" charset="-127"/>
-            </a:endParaRPr>
+              <a:t>Sport : ancien nageur de compétition (niveau national) ; pratique de la course à pied en compétition.</a:t>
+            </a:r>
           </a:p>
           <a:p>
             <a:r>

</xml_diff>